<commit_message>
fixed the powerPoint file - yuval
</commit_message>
<xml_diff>
--- a/IronDome.pptx
+++ b/IronDome.pptx
@@ -108,6 +108,11 @@
       </a:defRPr>
     </a:lvl9pPr>
   </p:defaultTextStyle>
+  <p:extLst>
+    <p:ext uri="{EFAFB233-063F-42B5-8137-9DF3F51BA10A}">
+      <p15:sldGuideLst xmlns:p15="http://schemas.microsoft.com/office/powerpoint/2012/main"/>
+    </p:ext>
+  </p:extLst>
 </p:presentation>
 </file>
 
@@ -141,7 +146,7 @@
           <p:cNvPr id="2" name="כותרת 1">
             <a:extLst>
               <a:ext uri="{FF2B5EF4-FFF2-40B4-BE49-F238E27FC236}">
-                <a16:creationId xmlns:a16="http://schemas.microsoft.com/office/drawing/2014/main" id="{97E78BFD-8DFA-4C38-AB67-C08393C766CD}"/>
+                <a16:creationId xmlns="" xmlns:a16="http://schemas.microsoft.com/office/drawing/2014/main" id="{97E78BFD-8DFA-4C38-AB67-C08393C766CD}"/>
               </a:ext>
             </a:extLst>
           </p:cNvPr>
@@ -178,7 +183,7 @@
           <p:cNvPr id="3" name="כותרת משנה 2">
             <a:extLst>
               <a:ext uri="{FF2B5EF4-FFF2-40B4-BE49-F238E27FC236}">
-                <a16:creationId xmlns:a16="http://schemas.microsoft.com/office/drawing/2014/main" id="{B71F2114-4A9B-4331-8A73-9F21D1E7B0A4}"/>
+                <a16:creationId xmlns="" xmlns:a16="http://schemas.microsoft.com/office/drawing/2014/main" id="{B71F2114-4A9B-4331-8A73-9F21D1E7B0A4}"/>
               </a:ext>
             </a:extLst>
           </p:cNvPr>
@@ -248,7 +253,7 @@
           <p:cNvPr id="4" name="מציין מיקום של תאריך 3">
             <a:extLst>
               <a:ext uri="{FF2B5EF4-FFF2-40B4-BE49-F238E27FC236}">
-                <a16:creationId xmlns:a16="http://schemas.microsoft.com/office/drawing/2014/main" id="{1095C31A-3E91-4A21-A27D-A8B1DBEAC757}"/>
+                <a16:creationId xmlns="" xmlns:a16="http://schemas.microsoft.com/office/drawing/2014/main" id="{1095C31A-3E91-4A21-A27D-A8B1DBEAC757}"/>
               </a:ext>
             </a:extLst>
           </p:cNvPr>
@@ -266,7 +271,7 @@
           <a:p>
             <a:fld id="{9452E159-71F0-4418-978D-0A46048A4287}" type="datetimeFigureOut">
               <a:rPr lang="he-IL" smtClean="0"/>
-              <a:t>י"ז/כסלו/תש"פ</a:t>
+              <a:t>י"ח/כסלו/תש"פ</a:t>
             </a:fld>
             <a:endParaRPr lang="he-IL"/>
           </a:p>
@@ -277,7 +282,7 @@
           <p:cNvPr id="5" name="מציין מיקום של כותרת תחתונה 4">
             <a:extLst>
               <a:ext uri="{FF2B5EF4-FFF2-40B4-BE49-F238E27FC236}">
-                <a16:creationId xmlns:a16="http://schemas.microsoft.com/office/drawing/2014/main" id="{248D03AF-9CB1-4AE8-8B2C-252144FB4B47}"/>
+                <a16:creationId xmlns="" xmlns:a16="http://schemas.microsoft.com/office/drawing/2014/main" id="{248D03AF-9CB1-4AE8-8B2C-252144FB4B47}"/>
               </a:ext>
             </a:extLst>
           </p:cNvPr>
@@ -302,7 +307,7 @@
           <p:cNvPr id="6" name="מציין מיקום של מספר שקופית 5">
             <a:extLst>
               <a:ext uri="{FF2B5EF4-FFF2-40B4-BE49-F238E27FC236}">
-                <a16:creationId xmlns:a16="http://schemas.microsoft.com/office/drawing/2014/main" id="{E307BB41-0BD7-439D-9589-49925B749CAC}"/>
+                <a16:creationId xmlns="" xmlns:a16="http://schemas.microsoft.com/office/drawing/2014/main" id="{E307BB41-0BD7-439D-9589-49925B749CAC}"/>
               </a:ext>
             </a:extLst>
           </p:cNvPr>
@@ -361,7 +366,7 @@
           <p:cNvPr id="2" name="כותרת 1">
             <a:extLst>
               <a:ext uri="{FF2B5EF4-FFF2-40B4-BE49-F238E27FC236}">
-                <a16:creationId xmlns:a16="http://schemas.microsoft.com/office/drawing/2014/main" id="{1DB8A550-154B-4270-A993-F05D114AF67A}"/>
+                <a16:creationId xmlns="" xmlns:a16="http://schemas.microsoft.com/office/drawing/2014/main" id="{1DB8A550-154B-4270-A993-F05D114AF67A}"/>
               </a:ext>
             </a:extLst>
           </p:cNvPr>
@@ -389,7 +394,7 @@
           <p:cNvPr id="3" name="מציין מיקום של טקסט אנכי 2">
             <a:extLst>
               <a:ext uri="{FF2B5EF4-FFF2-40B4-BE49-F238E27FC236}">
-                <a16:creationId xmlns:a16="http://schemas.microsoft.com/office/drawing/2014/main" id="{DF38A080-1D11-463C-8ED9-922B65018E06}"/>
+                <a16:creationId xmlns="" xmlns:a16="http://schemas.microsoft.com/office/drawing/2014/main" id="{DF38A080-1D11-463C-8ED9-922B65018E06}"/>
               </a:ext>
             </a:extLst>
           </p:cNvPr>
@@ -446,7 +451,7 @@
           <p:cNvPr id="4" name="מציין מיקום של תאריך 3">
             <a:extLst>
               <a:ext uri="{FF2B5EF4-FFF2-40B4-BE49-F238E27FC236}">
-                <a16:creationId xmlns:a16="http://schemas.microsoft.com/office/drawing/2014/main" id="{2314D488-A9DC-4854-B0F5-D41F54DF4F29}"/>
+                <a16:creationId xmlns="" xmlns:a16="http://schemas.microsoft.com/office/drawing/2014/main" id="{2314D488-A9DC-4854-B0F5-D41F54DF4F29}"/>
               </a:ext>
             </a:extLst>
           </p:cNvPr>
@@ -464,7 +469,7 @@
           <a:p>
             <a:fld id="{9452E159-71F0-4418-978D-0A46048A4287}" type="datetimeFigureOut">
               <a:rPr lang="he-IL" smtClean="0"/>
-              <a:t>י"ז/כסלו/תש"פ</a:t>
+              <a:t>י"ח/כסלו/תש"פ</a:t>
             </a:fld>
             <a:endParaRPr lang="he-IL"/>
           </a:p>
@@ -475,7 +480,7 @@
           <p:cNvPr id="5" name="מציין מיקום של כותרת תחתונה 4">
             <a:extLst>
               <a:ext uri="{FF2B5EF4-FFF2-40B4-BE49-F238E27FC236}">
-                <a16:creationId xmlns:a16="http://schemas.microsoft.com/office/drawing/2014/main" id="{41A2EFAB-843D-4724-A4B8-F1CF69716C77}"/>
+                <a16:creationId xmlns="" xmlns:a16="http://schemas.microsoft.com/office/drawing/2014/main" id="{41A2EFAB-843D-4724-A4B8-F1CF69716C77}"/>
               </a:ext>
             </a:extLst>
           </p:cNvPr>
@@ -500,7 +505,7 @@
           <p:cNvPr id="6" name="מציין מיקום של מספר שקופית 5">
             <a:extLst>
               <a:ext uri="{FF2B5EF4-FFF2-40B4-BE49-F238E27FC236}">
-                <a16:creationId xmlns:a16="http://schemas.microsoft.com/office/drawing/2014/main" id="{DD34A9C3-5667-4588-9969-A404972DBECE}"/>
+                <a16:creationId xmlns="" xmlns:a16="http://schemas.microsoft.com/office/drawing/2014/main" id="{DD34A9C3-5667-4588-9969-A404972DBECE}"/>
               </a:ext>
             </a:extLst>
           </p:cNvPr>
@@ -559,7 +564,7 @@
           <p:cNvPr id="2" name="כותרת אנכית 1">
             <a:extLst>
               <a:ext uri="{FF2B5EF4-FFF2-40B4-BE49-F238E27FC236}">
-                <a16:creationId xmlns:a16="http://schemas.microsoft.com/office/drawing/2014/main" id="{EE0985C0-3445-4F61-BB62-6AF8B6031739}"/>
+                <a16:creationId xmlns="" xmlns:a16="http://schemas.microsoft.com/office/drawing/2014/main" id="{EE0985C0-3445-4F61-BB62-6AF8B6031739}"/>
               </a:ext>
             </a:extLst>
           </p:cNvPr>
@@ -592,7 +597,7 @@
           <p:cNvPr id="3" name="מציין מיקום של טקסט אנכי 2">
             <a:extLst>
               <a:ext uri="{FF2B5EF4-FFF2-40B4-BE49-F238E27FC236}">
-                <a16:creationId xmlns:a16="http://schemas.microsoft.com/office/drawing/2014/main" id="{38E2374F-9E46-444C-9B7F-79397718EA4D}"/>
+                <a16:creationId xmlns="" xmlns:a16="http://schemas.microsoft.com/office/drawing/2014/main" id="{38E2374F-9E46-444C-9B7F-79397718EA4D}"/>
               </a:ext>
             </a:extLst>
           </p:cNvPr>
@@ -654,7 +659,7 @@
           <p:cNvPr id="4" name="מציין מיקום של תאריך 3">
             <a:extLst>
               <a:ext uri="{FF2B5EF4-FFF2-40B4-BE49-F238E27FC236}">
-                <a16:creationId xmlns:a16="http://schemas.microsoft.com/office/drawing/2014/main" id="{76F9271A-3A39-482E-9BDF-7C62F7CDE730}"/>
+                <a16:creationId xmlns="" xmlns:a16="http://schemas.microsoft.com/office/drawing/2014/main" id="{76F9271A-3A39-482E-9BDF-7C62F7CDE730}"/>
               </a:ext>
             </a:extLst>
           </p:cNvPr>
@@ -672,7 +677,7 @@
           <a:p>
             <a:fld id="{9452E159-71F0-4418-978D-0A46048A4287}" type="datetimeFigureOut">
               <a:rPr lang="he-IL" smtClean="0"/>
-              <a:t>י"ז/כסלו/תש"פ</a:t>
+              <a:t>י"ח/כסלו/תש"פ</a:t>
             </a:fld>
             <a:endParaRPr lang="he-IL"/>
           </a:p>
@@ -683,7 +688,7 @@
           <p:cNvPr id="5" name="מציין מיקום של כותרת תחתונה 4">
             <a:extLst>
               <a:ext uri="{FF2B5EF4-FFF2-40B4-BE49-F238E27FC236}">
-                <a16:creationId xmlns:a16="http://schemas.microsoft.com/office/drawing/2014/main" id="{37DE8741-72A5-4246-AFFB-B22A004DA8C1}"/>
+                <a16:creationId xmlns="" xmlns:a16="http://schemas.microsoft.com/office/drawing/2014/main" id="{37DE8741-72A5-4246-AFFB-B22A004DA8C1}"/>
               </a:ext>
             </a:extLst>
           </p:cNvPr>
@@ -708,7 +713,7 @@
           <p:cNvPr id="6" name="מציין מיקום של מספר שקופית 5">
             <a:extLst>
               <a:ext uri="{FF2B5EF4-FFF2-40B4-BE49-F238E27FC236}">
-                <a16:creationId xmlns:a16="http://schemas.microsoft.com/office/drawing/2014/main" id="{78CF161E-B794-4DF4-AC2E-4FE612FCF496}"/>
+                <a16:creationId xmlns="" xmlns:a16="http://schemas.microsoft.com/office/drawing/2014/main" id="{78CF161E-B794-4DF4-AC2E-4FE612FCF496}"/>
               </a:ext>
             </a:extLst>
           </p:cNvPr>
@@ -767,7 +772,7 @@
           <p:cNvPr id="2" name="כותרת 1">
             <a:extLst>
               <a:ext uri="{FF2B5EF4-FFF2-40B4-BE49-F238E27FC236}">
-                <a16:creationId xmlns:a16="http://schemas.microsoft.com/office/drawing/2014/main" id="{5847220D-AD4F-4EC4-81AE-B739D840C38A}"/>
+                <a16:creationId xmlns="" xmlns:a16="http://schemas.microsoft.com/office/drawing/2014/main" id="{5847220D-AD4F-4EC4-81AE-B739D840C38A}"/>
               </a:ext>
             </a:extLst>
           </p:cNvPr>
@@ -795,7 +800,7 @@
           <p:cNvPr id="3" name="מציין מיקום תוכן 2">
             <a:extLst>
               <a:ext uri="{FF2B5EF4-FFF2-40B4-BE49-F238E27FC236}">
-                <a16:creationId xmlns:a16="http://schemas.microsoft.com/office/drawing/2014/main" id="{EA530B56-0255-4D98-B5B2-BC1FF2292FB0}"/>
+                <a16:creationId xmlns="" xmlns:a16="http://schemas.microsoft.com/office/drawing/2014/main" id="{EA530B56-0255-4D98-B5B2-BC1FF2292FB0}"/>
               </a:ext>
             </a:extLst>
           </p:cNvPr>
@@ -852,7 +857,7 @@
           <p:cNvPr id="4" name="מציין מיקום של תאריך 3">
             <a:extLst>
               <a:ext uri="{FF2B5EF4-FFF2-40B4-BE49-F238E27FC236}">
-                <a16:creationId xmlns:a16="http://schemas.microsoft.com/office/drawing/2014/main" id="{8854C821-DA9C-496B-9842-C20665947DA1}"/>
+                <a16:creationId xmlns="" xmlns:a16="http://schemas.microsoft.com/office/drawing/2014/main" id="{8854C821-DA9C-496B-9842-C20665947DA1}"/>
               </a:ext>
             </a:extLst>
           </p:cNvPr>
@@ -870,7 +875,7 @@
           <a:p>
             <a:fld id="{9452E159-71F0-4418-978D-0A46048A4287}" type="datetimeFigureOut">
               <a:rPr lang="he-IL" smtClean="0"/>
-              <a:t>י"ז/כסלו/תש"פ</a:t>
+              <a:t>י"ח/כסלו/תש"פ</a:t>
             </a:fld>
             <a:endParaRPr lang="he-IL"/>
           </a:p>
@@ -881,7 +886,7 @@
           <p:cNvPr id="5" name="מציין מיקום של כותרת תחתונה 4">
             <a:extLst>
               <a:ext uri="{FF2B5EF4-FFF2-40B4-BE49-F238E27FC236}">
-                <a16:creationId xmlns:a16="http://schemas.microsoft.com/office/drawing/2014/main" id="{FDC4179A-E6AA-4C2F-9BA4-DB828DEBEBE6}"/>
+                <a16:creationId xmlns="" xmlns:a16="http://schemas.microsoft.com/office/drawing/2014/main" id="{FDC4179A-E6AA-4C2F-9BA4-DB828DEBEBE6}"/>
               </a:ext>
             </a:extLst>
           </p:cNvPr>
@@ -906,7 +911,7 @@
           <p:cNvPr id="6" name="מציין מיקום של מספר שקופית 5">
             <a:extLst>
               <a:ext uri="{FF2B5EF4-FFF2-40B4-BE49-F238E27FC236}">
-                <a16:creationId xmlns:a16="http://schemas.microsoft.com/office/drawing/2014/main" id="{E71CB480-BCD5-4CF1-A512-AA8FF4811B07}"/>
+                <a16:creationId xmlns="" xmlns:a16="http://schemas.microsoft.com/office/drawing/2014/main" id="{E71CB480-BCD5-4CF1-A512-AA8FF4811B07}"/>
               </a:ext>
             </a:extLst>
           </p:cNvPr>
@@ -965,7 +970,7 @@
           <p:cNvPr id="2" name="כותרת 1">
             <a:extLst>
               <a:ext uri="{FF2B5EF4-FFF2-40B4-BE49-F238E27FC236}">
-                <a16:creationId xmlns:a16="http://schemas.microsoft.com/office/drawing/2014/main" id="{1AF7EAB4-4D9A-4EB2-8D08-3BE3DCE9DA09}"/>
+                <a16:creationId xmlns="" xmlns:a16="http://schemas.microsoft.com/office/drawing/2014/main" id="{1AF7EAB4-4D9A-4EB2-8D08-3BE3DCE9DA09}"/>
               </a:ext>
             </a:extLst>
           </p:cNvPr>
@@ -1002,7 +1007,7 @@
           <p:cNvPr id="3" name="מציין מיקום טקסט 2">
             <a:extLst>
               <a:ext uri="{FF2B5EF4-FFF2-40B4-BE49-F238E27FC236}">
-                <a16:creationId xmlns:a16="http://schemas.microsoft.com/office/drawing/2014/main" id="{9FB01383-9886-456F-85F7-6AC959E950C5}"/>
+                <a16:creationId xmlns="" xmlns:a16="http://schemas.microsoft.com/office/drawing/2014/main" id="{9FB01383-9886-456F-85F7-6AC959E950C5}"/>
               </a:ext>
             </a:extLst>
           </p:cNvPr>
@@ -1127,7 +1132,7 @@
           <p:cNvPr id="4" name="מציין מיקום של תאריך 3">
             <a:extLst>
               <a:ext uri="{FF2B5EF4-FFF2-40B4-BE49-F238E27FC236}">
-                <a16:creationId xmlns:a16="http://schemas.microsoft.com/office/drawing/2014/main" id="{AAB90221-B65D-44E8-A246-4DD44F006D62}"/>
+                <a16:creationId xmlns="" xmlns:a16="http://schemas.microsoft.com/office/drawing/2014/main" id="{AAB90221-B65D-44E8-A246-4DD44F006D62}"/>
               </a:ext>
             </a:extLst>
           </p:cNvPr>
@@ -1145,7 +1150,7 @@
           <a:p>
             <a:fld id="{9452E159-71F0-4418-978D-0A46048A4287}" type="datetimeFigureOut">
               <a:rPr lang="he-IL" smtClean="0"/>
-              <a:t>י"ז/כסלו/תש"פ</a:t>
+              <a:t>י"ח/כסלו/תש"פ</a:t>
             </a:fld>
             <a:endParaRPr lang="he-IL"/>
           </a:p>
@@ -1156,7 +1161,7 @@
           <p:cNvPr id="5" name="מציין מיקום של כותרת תחתונה 4">
             <a:extLst>
               <a:ext uri="{FF2B5EF4-FFF2-40B4-BE49-F238E27FC236}">
-                <a16:creationId xmlns:a16="http://schemas.microsoft.com/office/drawing/2014/main" id="{3902E07B-E139-49A8-86A7-023612B82FA5}"/>
+                <a16:creationId xmlns="" xmlns:a16="http://schemas.microsoft.com/office/drawing/2014/main" id="{3902E07B-E139-49A8-86A7-023612B82FA5}"/>
               </a:ext>
             </a:extLst>
           </p:cNvPr>
@@ -1181,7 +1186,7 @@
           <p:cNvPr id="6" name="מציין מיקום של מספר שקופית 5">
             <a:extLst>
               <a:ext uri="{FF2B5EF4-FFF2-40B4-BE49-F238E27FC236}">
-                <a16:creationId xmlns:a16="http://schemas.microsoft.com/office/drawing/2014/main" id="{127C0DE8-C6B5-44FF-9A56-DF419630CE18}"/>
+                <a16:creationId xmlns="" xmlns:a16="http://schemas.microsoft.com/office/drawing/2014/main" id="{127C0DE8-C6B5-44FF-9A56-DF419630CE18}"/>
               </a:ext>
             </a:extLst>
           </p:cNvPr>
@@ -1240,7 +1245,7 @@
           <p:cNvPr id="2" name="כותרת 1">
             <a:extLst>
               <a:ext uri="{FF2B5EF4-FFF2-40B4-BE49-F238E27FC236}">
-                <a16:creationId xmlns:a16="http://schemas.microsoft.com/office/drawing/2014/main" id="{872992A9-2F89-40E0-B097-7C8C452D5019}"/>
+                <a16:creationId xmlns="" xmlns:a16="http://schemas.microsoft.com/office/drawing/2014/main" id="{872992A9-2F89-40E0-B097-7C8C452D5019}"/>
               </a:ext>
             </a:extLst>
           </p:cNvPr>
@@ -1268,7 +1273,7 @@
           <p:cNvPr id="3" name="מציין מיקום תוכן 2">
             <a:extLst>
               <a:ext uri="{FF2B5EF4-FFF2-40B4-BE49-F238E27FC236}">
-                <a16:creationId xmlns:a16="http://schemas.microsoft.com/office/drawing/2014/main" id="{55F314F7-99C4-48DC-A48A-CA0CB336B34B}"/>
+                <a16:creationId xmlns="" xmlns:a16="http://schemas.microsoft.com/office/drawing/2014/main" id="{55F314F7-99C4-48DC-A48A-CA0CB336B34B}"/>
               </a:ext>
             </a:extLst>
           </p:cNvPr>
@@ -1330,7 +1335,7 @@
           <p:cNvPr id="4" name="מציין מיקום תוכן 3">
             <a:extLst>
               <a:ext uri="{FF2B5EF4-FFF2-40B4-BE49-F238E27FC236}">
-                <a16:creationId xmlns:a16="http://schemas.microsoft.com/office/drawing/2014/main" id="{AA51D800-31E7-4614-8A5E-1CE934192A4B}"/>
+                <a16:creationId xmlns="" xmlns:a16="http://schemas.microsoft.com/office/drawing/2014/main" id="{AA51D800-31E7-4614-8A5E-1CE934192A4B}"/>
               </a:ext>
             </a:extLst>
           </p:cNvPr>
@@ -1392,7 +1397,7 @@
           <p:cNvPr id="5" name="מציין מיקום של תאריך 4">
             <a:extLst>
               <a:ext uri="{FF2B5EF4-FFF2-40B4-BE49-F238E27FC236}">
-                <a16:creationId xmlns:a16="http://schemas.microsoft.com/office/drawing/2014/main" id="{27B4D5B5-E347-4709-A90E-CAF0EC2347A2}"/>
+                <a16:creationId xmlns="" xmlns:a16="http://schemas.microsoft.com/office/drawing/2014/main" id="{27B4D5B5-E347-4709-A90E-CAF0EC2347A2}"/>
               </a:ext>
             </a:extLst>
           </p:cNvPr>
@@ -1410,7 +1415,7 @@
           <a:p>
             <a:fld id="{9452E159-71F0-4418-978D-0A46048A4287}" type="datetimeFigureOut">
               <a:rPr lang="he-IL" smtClean="0"/>
-              <a:t>י"ז/כסלו/תש"פ</a:t>
+              <a:t>י"ח/כסלו/תש"פ</a:t>
             </a:fld>
             <a:endParaRPr lang="he-IL"/>
           </a:p>
@@ -1421,7 +1426,7 @@
           <p:cNvPr id="6" name="מציין מיקום של כותרת תחתונה 5">
             <a:extLst>
               <a:ext uri="{FF2B5EF4-FFF2-40B4-BE49-F238E27FC236}">
-                <a16:creationId xmlns:a16="http://schemas.microsoft.com/office/drawing/2014/main" id="{AF517BD8-BBA2-4CB7-9DB0-2BDE15822547}"/>
+                <a16:creationId xmlns="" xmlns:a16="http://schemas.microsoft.com/office/drawing/2014/main" id="{AF517BD8-BBA2-4CB7-9DB0-2BDE15822547}"/>
               </a:ext>
             </a:extLst>
           </p:cNvPr>
@@ -1446,7 +1451,7 @@
           <p:cNvPr id="7" name="מציין מיקום של מספר שקופית 6">
             <a:extLst>
               <a:ext uri="{FF2B5EF4-FFF2-40B4-BE49-F238E27FC236}">
-                <a16:creationId xmlns:a16="http://schemas.microsoft.com/office/drawing/2014/main" id="{6DDD96B5-A9E2-4D97-980F-5ABE5C259B0C}"/>
+                <a16:creationId xmlns="" xmlns:a16="http://schemas.microsoft.com/office/drawing/2014/main" id="{6DDD96B5-A9E2-4D97-980F-5ABE5C259B0C}"/>
               </a:ext>
             </a:extLst>
           </p:cNvPr>
@@ -1505,7 +1510,7 @@
           <p:cNvPr id="2" name="כותרת 1">
             <a:extLst>
               <a:ext uri="{FF2B5EF4-FFF2-40B4-BE49-F238E27FC236}">
-                <a16:creationId xmlns:a16="http://schemas.microsoft.com/office/drawing/2014/main" id="{7C584510-E439-4ADA-880F-D993900B409F}"/>
+                <a16:creationId xmlns="" xmlns:a16="http://schemas.microsoft.com/office/drawing/2014/main" id="{7C584510-E439-4ADA-880F-D993900B409F}"/>
               </a:ext>
             </a:extLst>
           </p:cNvPr>
@@ -1538,7 +1543,7 @@
           <p:cNvPr id="3" name="מציין מיקום טקסט 2">
             <a:extLst>
               <a:ext uri="{FF2B5EF4-FFF2-40B4-BE49-F238E27FC236}">
-                <a16:creationId xmlns:a16="http://schemas.microsoft.com/office/drawing/2014/main" id="{9DFFE889-3947-4FAD-8A97-72469CF26818}"/>
+                <a16:creationId xmlns="" xmlns:a16="http://schemas.microsoft.com/office/drawing/2014/main" id="{9DFFE889-3947-4FAD-8A97-72469CF26818}"/>
               </a:ext>
             </a:extLst>
           </p:cNvPr>
@@ -1609,7 +1614,7 @@
           <p:cNvPr id="4" name="מציין מיקום תוכן 3">
             <a:extLst>
               <a:ext uri="{FF2B5EF4-FFF2-40B4-BE49-F238E27FC236}">
-                <a16:creationId xmlns:a16="http://schemas.microsoft.com/office/drawing/2014/main" id="{E05C2DE2-C5E5-4594-BBB0-D81301698C0C}"/>
+                <a16:creationId xmlns="" xmlns:a16="http://schemas.microsoft.com/office/drawing/2014/main" id="{E05C2DE2-C5E5-4594-BBB0-D81301698C0C}"/>
               </a:ext>
             </a:extLst>
           </p:cNvPr>
@@ -1671,7 +1676,7 @@
           <p:cNvPr id="5" name="מציין מיקום טקסט 4">
             <a:extLst>
               <a:ext uri="{FF2B5EF4-FFF2-40B4-BE49-F238E27FC236}">
-                <a16:creationId xmlns:a16="http://schemas.microsoft.com/office/drawing/2014/main" id="{4AA774EE-138C-42BC-8F8E-6583F007B7BA}"/>
+                <a16:creationId xmlns="" xmlns:a16="http://schemas.microsoft.com/office/drawing/2014/main" id="{4AA774EE-138C-42BC-8F8E-6583F007B7BA}"/>
               </a:ext>
             </a:extLst>
           </p:cNvPr>
@@ -1742,7 +1747,7 @@
           <p:cNvPr id="6" name="מציין מיקום תוכן 5">
             <a:extLst>
               <a:ext uri="{FF2B5EF4-FFF2-40B4-BE49-F238E27FC236}">
-                <a16:creationId xmlns:a16="http://schemas.microsoft.com/office/drawing/2014/main" id="{E13940FB-5257-406E-9F1B-69C91A3F396A}"/>
+                <a16:creationId xmlns="" xmlns:a16="http://schemas.microsoft.com/office/drawing/2014/main" id="{E13940FB-5257-406E-9F1B-69C91A3F396A}"/>
               </a:ext>
             </a:extLst>
           </p:cNvPr>
@@ -1804,7 +1809,7 @@
           <p:cNvPr id="7" name="מציין מיקום של תאריך 6">
             <a:extLst>
               <a:ext uri="{FF2B5EF4-FFF2-40B4-BE49-F238E27FC236}">
-                <a16:creationId xmlns:a16="http://schemas.microsoft.com/office/drawing/2014/main" id="{5396B871-FCA9-4BCA-8799-7565DD7555DD}"/>
+                <a16:creationId xmlns="" xmlns:a16="http://schemas.microsoft.com/office/drawing/2014/main" id="{5396B871-FCA9-4BCA-8799-7565DD7555DD}"/>
               </a:ext>
             </a:extLst>
           </p:cNvPr>
@@ -1822,7 +1827,7 @@
           <a:p>
             <a:fld id="{9452E159-71F0-4418-978D-0A46048A4287}" type="datetimeFigureOut">
               <a:rPr lang="he-IL" smtClean="0"/>
-              <a:t>י"ז/כסלו/תש"פ</a:t>
+              <a:t>י"ח/כסלו/תש"פ</a:t>
             </a:fld>
             <a:endParaRPr lang="he-IL"/>
           </a:p>
@@ -1833,7 +1838,7 @@
           <p:cNvPr id="8" name="מציין מיקום של כותרת תחתונה 7">
             <a:extLst>
               <a:ext uri="{FF2B5EF4-FFF2-40B4-BE49-F238E27FC236}">
-                <a16:creationId xmlns:a16="http://schemas.microsoft.com/office/drawing/2014/main" id="{B62E1F9C-BEA0-440E-8471-FD1545EA0739}"/>
+                <a16:creationId xmlns="" xmlns:a16="http://schemas.microsoft.com/office/drawing/2014/main" id="{B62E1F9C-BEA0-440E-8471-FD1545EA0739}"/>
               </a:ext>
             </a:extLst>
           </p:cNvPr>
@@ -1858,7 +1863,7 @@
           <p:cNvPr id="9" name="מציין מיקום של מספר שקופית 8">
             <a:extLst>
               <a:ext uri="{FF2B5EF4-FFF2-40B4-BE49-F238E27FC236}">
-                <a16:creationId xmlns:a16="http://schemas.microsoft.com/office/drawing/2014/main" id="{C49A2FB3-13C0-4C1C-A635-68D65D54075B}"/>
+                <a16:creationId xmlns="" xmlns:a16="http://schemas.microsoft.com/office/drawing/2014/main" id="{C49A2FB3-13C0-4C1C-A635-68D65D54075B}"/>
               </a:ext>
             </a:extLst>
           </p:cNvPr>
@@ -1917,7 +1922,7 @@
           <p:cNvPr id="2" name="כותרת 1">
             <a:extLst>
               <a:ext uri="{FF2B5EF4-FFF2-40B4-BE49-F238E27FC236}">
-                <a16:creationId xmlns:a16="http://schemas.microsoft.com/office/drawing/2014/main" id="{C365E3B1-1B1C-4CBA-A3A5-45A230297374}"/>
+                <a16:creationId xmlns="" xmlns:a16="http://schemas.microsoft.com/office/drawing/2014/main" id="{C365E3B1-1B1C-4CBA-A3A5-45A230297374}"/>
               </a:ext>
             </a:extLst>
           </p:cNvPr>
@@ -1945,7 +1950,7 @@
           <p:cNvPr id="3" name="מציין מיקום של תאריך 2">
             <a:extLst>
               <a:ext uri="{FF2B5EF4-FFF2-40B4-BE49-F238E27FC236}">
-                <a16:creationId xmlns:a16="http://schemas.microsoft.com/office/drawing/2014/main" id="{3C7B9576-13E1-4623-8E2F-BA7D98245757}"/>
+                <a16:creationId xmlns="" xmlns:a16="http://schemas.microsoft.com/office/drawing/2014/main" id="{3C7B9576-13E1-4623-8E2F-BA7D98245757}"/>
               </a:ext>
             </a:extLst>
           </p:cNvPr>
@@ -1963,7 +1968,7 @@
           <a:p>
             <a:fld id="{9452E159-71F0-4418-978D-0A46048A4287}" type="datetimeFigureOut">
               <a:rPr lang="he-IL" smtClean="0"/>
-              <a:t>י"ז/כסלו/תש"פ</a:t>
+              <a:t>י"ח/כסלו/תש"פ</a:t>
             </a:fld>
             <a:endParaRPr lang="he-IL"/>
           </a:p>
@@ -1974,7 +1979,7 @@
           <p:cNvPr id="4" name="מציין מיקום של כותרת תחתונה 3">
             <a:extLst>
               <a:ext uri="{FF2B5EF4-FFF2-40B4-BE49-F238E27FC236}">
-                <a16:creationId xmlns:a16="http://schemas.microsoft.com/office/drawing/2014/main" id="{1FBACF4F-156B-45A5-AE37-DD0EB8B557D6}"/>
+                <a16:creationId xmlns="" xmlns:a16="http://schemas.microsoft.com/office/drawing/2014/main" id="{1FBACF4F-156B-45A5-AE37-DD0EB8B557D6}"/>
               </a:ext>
             </a:extLst>
           </p:cNvPr>
@@ -1999,7 +2004,7 @@
           <p:cNvPr id="5" name="מציין מיקום של מספר שקופית 4">
             <a:extLst>
               <a:ext uri="{FF2B5EF4-FFF2-40B4-BE49-F238E27FC236}">
-                <a16:creationId xmlns:a16="http://schemas.microsoft.com/office/drawing/2014/main" id="{ACD69C6D-76F2-4CA0-900C-1AC3C88365A2}"/>
+                <a16:creationId xmlns="" xmlns:a16="http://schemas.microsoft.com/office/drawing/2014/main" id="{ACD69C6D-76F2-4CA0-900C-1AC3C88365A2}"/>
               </a:ext>
             </a:extLst>
           </p:cNvPr>
@@ -2058,7 +2063,7 @@
           <p:cNvPr id="2" name="מציין מיקום של תאריך 1">
             <a:extLst>
               <a:ext uri="{FF2B5EF4-FFF2-40B4-BE49-F238E27FC236}">
-                <a16:creationId xmlns:a16="http://schemas.microsoft.com/office/drawing/2014/main" id="{55619AFD-7CF4-4BE0-A9EA-3A046FA415E6}"/>
+                <a16:creationId xmlns="" xmlns:a16="http://schemas.microsoft.com/office/drawing/2014/main" id="{55619AFD-7CF4-4BE0-A9EA-3A046FA415E6}"/>
               </a:ext>
             </a:extLst>
           </p:cNvPr>
@@ -2076,7 +2081,7 @@
           <a:p>
             <a:fld id="{9452E159-71F0-4418-978D-0A46048A4287}" type="datetimeFigureOut">
               <a:rPr lang="he-IL" smtClean="0"/>
-              <a:t>י"ז/כסלו/תש"פ</a:t>
+              <a:t>י"ח/כסלו/תש"פ</a:t>
             </a:fld>
             <a:endParaRPr lang="he-IL"/>
           </a:p>
@@ -2087,7 +2092,7 @@
           <p:cNvPr id="3" name="מציין מיקום של כותרת תחתונה 2">
             <a:extLst>
               <a:ext uri="{FF2B5EF4-FFF2-40B4-BE49-F238E27FC236}">
-                <a16:creationId xmlns:a16="http://schemas.microsoft.com/office/drawing/2014/main" id="{8A14F462-DB5E-4B87-80A5-ACC757F88BFE}"/>
+                <a16:creationId xmlns="" xmlns:a16="http://schemas.microsoft.com/office/drawing/2014/main" id="{8A14F462-DB5E-4B87-80A5-ACC757F88BFE}"/>
               </a:ext>
             </a:extLst>
           </p:cNvPr>
@@ -2112,7 +2117,7 @@
           <p:cNvPr id="4" name="מציין מיקום של מספר שקופית 3">
             <a:extLst>
               <a:ext uri="{FF2B5EF4-FFF2-40B4-BE49-F238E27FC236}">
-                <a16:creationId xmlns:a16="http://schemas.microsoft.com/office/drawing/2014/main" id="{19C2A784-3CB6-4826-A3B1-F4CDA0BA9C0D}"/>
+                <a16:creationId xmlns="" xmlns:a16="http://schemas.microsoft.com/office/drawing/2014/main" id="{19C2A784-3CB6-4826-A3B1-F4CDA0BA9C0D}"/>
               </a:ext>
             </a:extLst>
           </p:cNvPr>
@@ -2171,7 +2176,7 @@
           <p:cNvPr id="2" name="כותרת 1">
             <a:extLst>
               <a:ext uri="{FF2B5EF4-FFF2-40B4-BE49-F238E27FC236}">
-                <a16:creationId xmlns:a16="http://schemas.microsoft.com/office/drawing/2014/main" id="{C77F35A0-4326-4D64-BBF1-B882B4420287}"/>
+                <a16:creationId xmlns="" xmlns:a16="http://schemas.microsoft.com/office/drawing/2014/main" id="{C77F35A0-4326-4D64-BBF1-B882B4420287}"/>
               </a:ext>
             </a:extLst>
           </p:cNvPr>
@@ -2208,7 +2213,7 @@
           <p:cNvPr id="3" name="מציין מיקום תוכן 2">
             <a:extLst>
               <a:ext uri="{FF2B5EF4-FFF2-40B4-BE49-F238E27FC236}">
-                <a16:creationId xmlns:a16="http://schemas.microsoft.com/office/drawing/2014/main" id="{836E6BAE-4026-48D6-9B87-6CFC7BEEDDA3}"/>
+                <a16:creationId xmlns="" xmlns:a16="http://schemas.microsoft.com/office/drawing/2014/main" id="{836E6BAE-4026-48D6-9B87-6CFC7BEEDDA3}"/>
               </a:ext>
             </a:extLst>
           </p:cNvPr>
@@ -2298,7 +2303,7 @@
           <p:cNvPr id="4" name="מציין מיקום טקסט 3">
             <a:extLst>
               <a:ext uri="{FF2B5EF4-FFF2-40B4-BE49-F238E27FC236}">
-                <a16:creationId xmlns:a16="http://schemas.microsoft.com/office/drawing/2014/main" id="{26DC3A34-901F-4E8F-95FC-70E98E013638}"/>
+                <a16:creationId xmlns="" xmlns:a16="http://schemas.microsoft.com/office/drawing/2014/main" id="{26DC3A34-901F-4E8F-95FC-70E98E013638}"/>
               </a:ext>
             </a:extLst>
           </p:cNvPr>
@@ -2369,7 +2374,7 @@
           <p:cNvPr id="5" name="מציין מיקום של תאריך 4">
             <a:extLst>
               <a:ext uri="{FF2B5EF4-FFF2-40B4-BE49-F238E27FC236}">
-                <a16:creationId xmlns:a16="http://schemas.microsoft.com/office/drawing/2014/main" id="{4BF1DEBE-4570-45FB-982C-AF5599B31C17}"/>
+                <a16:creationId xmlns="" xmlns:a16="http://schemas.microsoft.com/office/drawing/2014/main" id="{4BF1DEBE-4570-45FB-982C-AF5599B31C17}"/>
               </a:ext>
             </a:extLst>
           </p:cNvPr>
@@ -2387,7 +2392,7 @@
           <a:p>
             <a:fld id="{9452E159-71F0-4418-978D-0A46048A4287}" type="datetimeFigureOut">
               <a:rPr lang="he-IL" smtClean="0"/>
-              <a:t>י"ז/כסלו/תש"פ</a:t>
+              <a:t>י"ח/כסלו/תש"פ</a:t>
             </a:fld>
             <a:endParaRPr lang="he-IL"/>
           </a:p>
@@ -2398,7 +2403,7 @@
           <p:cNvPr id="6" name="מציין מיקום של כותרת תחתונה 5">
             <a:extLst>
               <a:ext uri="{FF2B5EF4-FFF2-40B4-BE49-F238E27FC236}">
-                <a16:creationId xmlns:a16="http://schemas.microsoft.com/office/drawing/2014/main" id="{A95856F5-9FA1-4EF9-9D76-BC8FEC95A380}"/>
+                <a16:creationId xmlns="" xmlns:a16="http://schemas.microsoft.com/office/drawing/2014/main" id="{A95856F5-9FA1-4EF9-9D76-BC8FEC95A380}"/>
               </a:ext>
             </a:extLst>
           </p:cNvPr>
@@ -2423,7 +2428,7 @@
           <p:cNvPr id="7" name="מציין מיקום של מספר שקופית 6">
             <a:extLst>
               <a:ext uri="{FF2B5EF4-FFF2-40B4-BE49-F238E27FC236}">
-                <a16:creationId xmlns:a16="http://schemas.microsoft.com/office/drawing/2014/main" id="{DFCA9825-9DE8-42CC-8F49-696D7A1D887E}"/>
+                <a16:creationId xmlns="" xmlns:a16="http://schemas.microsoft.com/office/drawing/2014/main" id="{DFCA9825-9DE8-42CC-8F49-696D7A1D887E}"/>
               </a:ext>
             </a:extLst>
           </p:cNvPr>
@@ -2482,7 +2487,7 @@
           <p:cNvPr id="2" name="כותרת 1">
             <a:extLst>
               <a:ext uri="{FF2B5EF4-FFF2-40B4-BE49-F238E27FC236}">
-                <a16:creationId xmlns:a16="http://schemas.microsoft.com/office/drawing/2014/main" id="{E16228EF-BF0F-4C5A-B2E7-ED9436D6BF34}"/>
+                <a16:creationId xmlns="" xmlns:a16="http://schemas.microsoft.com/office/drawing/2014/main" id="{E16228EF-BF0F-4C5A-B2E7-ED9436D6BF34}"/>
               </a:ext>
             </a:extLst>
           </p:cNvPr>
@@ -2519,7 +2524,7 @@
           <p:cNvPr id="3" name="מציין מיקום של תמונה 2">
             <a:extLst>
               <a:ext uri="{FF2B5EF4-FFF2-40B4-BE49-F238E27FC236}">
-                <a16:creationId xmlns:a16="http://schemas.microsoft.com/office/drawing/2014/main" id="{3F26E506-3EB3-4DE2-90F3-D17050A097C8}"/>
+                <a16:creationId xmlns="" xmlns:a16="http://schemas.microsoft.com/office/drawing/2014/main" id="{3F26E506-3EB3-4DE2-90F3-D17050A097C8}"/>
               </a:ext>
             </a:extLst>
           </p:cNvPr>
@@ -2586,7 +2591,7 @@
           <p:cNvPr id="4" name="מציין מיקום טקסט 3">
             <a:extLst>
               <a:ext uri="{FF2B5EF4-FFF2-40B4-BE49-F238E27FC236}">
-                <a16:creationId xmlns:a16="http://schemas.microsoft.com/office/drawing/2014/main" id="{D9CCFADF-86C6-4029-B42C-5B24FC9239E6}"/>
+                <a16:creationId xmlns="" xmlns:a16="http://schemas.microsoft.com/office/drawing/2014/main" id="{D9CCFADF-86C6-4029-B42C-5B24FC9239E6}"/>
               </a:ext>
             </a:extLst>
           </p:cNvPr>
@@ -2657,7 +2662,7 @@
           <p:cNvPr id="5" name="מציין מיקום של תאריך 4">
             <a:extLst>
               <a:ext uri="{FF2B5EF4-FFF2-40B4-BE49-F238E27FC236}">
-                <a16:creationId xmlns:a16="http://schemas.microsoft.com/office/drawing/2014/main" id="{5474FF3E-7794-4608-A702-23E9CC1804A5}"/>
+                <a16:creationId xmlns="" xmlns:a16="http://schemas.microsoft.com/office/drawing/2014/main" id="{5474FF3E-7794-4608-A702-23E9CC1804A5}"/>
               </a:ext>
             </a:extLst>
           </p:cNvPr>
@@ -2675,7 +2680,7 @@
           <a:p>
             <a:fld id="{9452E159-71F0-4418-978D-0A46048A4287}" type="datetimeFigureOut">
               <a:rPr lang="he-IL" smtClean="0"/>
-              <a:t>י"ז/כסלו/תש"פ</a:t>
+              <a:t>י"ח/כסלו/תש"פ</a:t>
             </a:fld>
             <a:endParaRPr lang="he-IL"/>
           </a:p>
@@ -2686,7 +2691,7 @@
           <p:cNvPr id="6" name="מציין מיקום של כותרת תחתונה 5">
             <a:extLst>
               <a:ext uri="{FF2B5EF4-FFF2-40B4-BE49-F238E27FC236}">
-                <a16:creationId xmlns:a16="http://schemas.microsoft.com/office/drawing/2014/main" id="{C6ECF620-6C21-4CB0-96A3-22014B175C23}"/>
+                <a16:creationId xmlns="" xmlns:a16="http://schemas.microsoft.com/office/drawing/2014/main" id="{C6ECF620-6C21-4CB0-96A3-22014B175C23}"/>
               </a:ext>
             </a:extLst>
           </p:cNvPr>
@@ -2711,7 +2716,7 @@
           <p:cNvPr id="7" name="מציין מיקום של מספר שקופית 6">
             <a:extLst>
               <a:ext uri="{FF2B5EF4-FFF2-40B4-BE49-F238E27FC236}">
-                <a16:creationId xmlns:a16="http://schemas.microsoft.com/office/drawing/2014/main" id="{E730F33A-4516-4A2C-872B-23912DB9CC5B}"/>
+                <a16:creationId xmlns="" xmlns:a16="http://schemas.microsoft.com/office/drawing/2014/main" id="{E730F33A-4516-4A2C-872B-23912DB9CC5B}"/>
               </a:ext>
             </a:extLst>
           </p:cNvPr>
@@ -2775,7 +2780,7 @@
           <p:cNvPr id="2" name="מציין מיקום של כותרת 1">
             <a:extLst>
               <a:ext uri="{FF2B5EF4-FFF2-40B4-BE49-F238E27FC236}">
-                <a16:creationId xmlns:a16="http://schemas.microsoft.com/office/drawing/2014/main" id="{DFC9B986-5358-4E17-B216-2D1A9ACA0E69}"/>
+                <a16:creationId xmlns="" xmlns:a16="http://schemas.microsoft.com/office/drawing/2014/main" id="{DFC9B986-5358-4E17-B216-2D1A9ACA0E69}"/>
               </a:ext>
             </a:extLst>
           </p:cNvPr>
@@ -2813,7 +2818,7 @@
           <p:cNvPr id="3" name="מציין מיקום טקסט 2">
             <a:extLst>
               <a:ext uri="{FF2B5EF4-FFF2-40B4-BE49-F238E27FC236}">
-                <a16:creationId xmlns:a16="http://schemas.microsoft.com/office/drawing/2014/main" id="{D8C3FD3F-CA8C-4E2D-AE76-9A9E4B716E03}"/>
+                <a16:creationId xmlns="" xmlns:a16="http://schemas.microsoft.com/office/drawing/2014/main" id="{D8C3FD3F-CA8C-4E2D-AE76-9A9E4B716E03}"/>
               </a:ext>
             </a:extLst>
           </p:cNvPr>
@@ -2880,7 +2885,7 @@
           <p:cNvPr id="4" name="מציין מיקום של תאריך 3">
             <a:extLst>
               <a:ext uri="{FF2B5EF4-FFF2-40B4-BE49-F238E27FC236}">
-                <a16:creationId xmlns:a16="http://schemas.microsoft.com/office/drawing/2014/main" id="{A1E5D346-A1F4-4A5C-855E-178689E82A9D}"/>
+                <a16:creationId xmlns="" xmlns:a16="http://schemas.microsoft.com/office/drawing/2014/main" id="{A1E5D346-A1F4-4A5C-855E-178689E82A9D}"/>
               </a:ext>
             </a:extLst>
           </p:cNvPr>
@@ -2916,7 +2921,7 @@
           <a:p>
             <a:fld id="{9452E159-71F0-4418-978D-0A46048A4287}" type="datetimeFigureOut">
               <a:rPr lang="he-IL" smtClean="0"/>
-              <a:t>י"ז/כסלו/תש"פ</a:t>
+              <a:t>י"ח/כסלו/תש"פ</a:t>
             </a:fld>
             <a:endParaRPr lang="he-IL"/>
           </a:p>
@@ -2927,7 +2932,7 @@
           <p:cNvPr id="5" name="מציין מיקום של כותרת תחתונה 4">
             <a:extLst>
               <a:ext uri="{FF2B5EF4-FFF2-40B4-BE49-F238E27FC236}">
-                <a16:creationId xmlns:a16="http://schemas.microsoft.com/office/drawing/2014/main" id="{71446BFF-81FD-4D30-B2CC-FE55D20DE3B4}"/>
+                <a16:creationId xmlns="" xmlns:a16="http://schemas.microsoft.com/office/drawing/2014/main" id="{71446BFF-81FD-4D30-B2CC-FE55D20DE3B4}"/>
               </a:ext>
             </a:extLst>
           </p:cNvPr>
@@ -2970,7 +2975,7 @@
           <p:cNvPr id="6" name="מציין מיקום של מספר שקופית 5">
             <a:extLst>
               <a:ext uri="{FF2B5EF4-FFF2-40B4-BE49-F238E27FC236}">
-                <a16:creationId xmlns:a16="http://schemas.microsoft.com/office/drawing/2014/main" id="{0C610019-9983-4374-A4B7-535EDF329F29}"/>
+                <a16:creationId xmlns="" xmlns:a16="http://schemas.microsoft.com/office/drawing/2014/main" id="{0C610019-9983-4374-A4B7-535EDF329F29}"/>
               </a:ext>
             </a:extLst>
           </p:cNvPr>
@@ -3319,6 +3324,20 @@
 <file path=ppt/slides/slide1.xml><?xml version="1.0" encoding="utf-8"?>
 <p:sld xmlns:a="http://schemas.openxmlformats.org/drawingml/2006/main" xmlns:r="http://schemas.openxmlformats.org/officeDocument/2006/relationships" xmlns:p="http://schemas.openxmlformats.org/presentationml/2006/main">
   <p:cSld>
+    <p:bg>
+      <p:bgPr>
+        <a:blipFill dpi="0" rotWithShape="1">
+          <a:blip r:embed="rId2">
+            <a:lum/>
+          </a:blip>
+          <a:srcRect/>
+          <a:stretch>
+            <a:fillRect/>
+          </a:stretch>
+        </a:blipFill>
+        <a:effectLst/>
+      </p:bgPr>
+    </p:bg>
     <p:spTree>
       <p:nvGrpSpPr>
         <p:cNvPr id="1" name=""/>
@@ -3335,42 +3354,10 @@
       </p:grpSpPr>
       <p:sp>
         <p:nvSpPr>
-          <p:cNvPr id="2" name="כותרת 1">
-            <a:extLst>
-              <a:ext uri="{FF2B5EF4-FFF2-40B4-BE49-F238E27FC236}">
-                <a16:creationId xmlns:a16="http://schemas.microsoft.com/office/drawing/2014/main" id="{FF2C267A-2879-46A1-8E1B-7E8FF717AC36}"/>
-              </a:ext>
-            </a:extLst>
-          </p:cNvPr>
-          <p:cNvSpPr>
-            <a:spLocks noGrp="1"/>
-          </p:cNvSpPr>
-          <p:nvPr>
-            <p:ph type="ctrTitle"/>
-          </p:nvPr>
-        </p:nvSpPr>
-        <p:spPr/>
-        <p:txBody>
-          <a:bodyPr/>
-          <a:lstStyle/>
-          <a:p>
-            <a:r>
-              <a:rPr lang="en-US" dirty="0"/>
-              <a:t>Iron Dome</a:t>
-            </a:r>
-            <a:br>
-              <a:rPr lang="en-US" dirty="0"/>
-            </a:br>
-            <a:endParaRPr lang="he-IL" dirty="0"/>
-          </a:p>
-        </p:txBody>
-      </p:sp>
-      <p:sp>
-        <p:nvSpPr>
           <p:cNvPr id="3" name="כותרת משנה 2">
             <a:extLst>
               <a:ext uri="{FF2B5EF4-FFF2-40B4-BE49-F238E27FC236}">
-                <a16:creationId xmlns:a16="http://schemas.microsoft.com/office/drawing/2014/main" id="{41E5A72D-7C51-4228-8BEA-8C0F3A2C0F71}"/>
+                <a16:creationId xmlns="" xmlns:a16="http://schemas.microsoft.com/office/drawing/2014/main" id="{41E5A72D-7C51-4228-8BEA-8C0F3A2C0F71}"/>
               </a:ext>
             </a:extLst>
           </p:cNvPr>
@@ -3381,7 +3368,12 @@
             <p:ph type="subTitle" idx="1"/>
           </p:nvPr>
         </p:nvSpPr>
-        <p:spPr/>
+        <p:spPr>
+          <a:xfrm>
+            <a:off x="6360160" y="320358"/>
+            <a:ext cx="9144000" cy="1655762"/>
+          </a:xfrm>
+        </p:spPr>
         <p:txBody>
           <a:bodyPr/>
           <a:lstStyle/>
@@ -3415,6 +3407,21 @@
 <file path=ppt/slides/slide2.xml><?xml version="1.0" encoding="utf-8"?>
 <p:sld xmlns:a="http://schemas.openxmlformats.org/drawingml/2006/main" xmlns:r="http://schemas.openxmlformats.org/officeDocument/2006/relationships" xmlns:p="http://schemas.openxmlformats.org/presentationml/2006/main">
   <p:cSld>
+    <p:bg>
+      <p:bgPr>
+        <a:blipFill dpi="0" rotWithShape="1">
+          <a:blip r:embed="rId2">
+            <a:alphaModFix amt="40000"/>
+            <a:lum/>
+          </a:blip>
+          <a:srcRect/>
+          <a:stretch>
+            <a:fillRect t="-7000" b="-7000"/>
+          </a:stretch>
+        </a:blipFill>
+        <a:effectLst/>
+      </p:bgPr>
+    </p:bg>
     <p:spTree>
       <p:nvGrpSpPr>
         <p:cNvPr id="1" name=""/>
@@ -3434,7 +3441,7 @@
           <p:cNvPr id="2" name="כותרת 1">
             <a:extLst>
               <a:ext uri="{FF2B5EF4-FFF2-40B4-BE49-F238E27FC236}">
-                <a16:creationId xmlns:a16="http://schemas.microsoft.com/office/drawing/2014/main" id="{C75679D5-1FC7-4876-9DE1-3325A30518D7}"/>
+                <a16:creationId xmlns="" xmlns:a16="http://schemas.microsoft.com/office/drawing/2014/main" id="{C75679D5-1FC7-4876-9DE1-3325A30518D7}"/>
               </a:ext>
             </a:extLst>
           </p:cNvPr>
@@ -3463,7 +3470,7 @@
           <p:cNvPr id="3" name="מציין מיקום תוכן 2">
             <a:extLst>
               <a:ext uri="{FF2B5EF4-FFF2-40B4-BE49-F238E27FC236}">
-                <a16:creationId xmlns:a16="http://schemas.microsoft.com/office/drawing/2014/main" id="{88324B1C-B29B-4222-B128-F104EB2E05F8}"/>
+                <a16:creationId xmlns="" xmlns:a16="http://schemas.microsoft.com/office/drawing/2014/main" id="{88324B1C-B29B-4222-B128-F104EB2E05F8}"/>
               </a:ext>
             </a:extLst>
           </p:cNvPr>
@@ -3474,11 +3481,17 @@
             <p:ph idx="1"/>
           </p:nvPr>
         </p:nvSpPr>
-        <p:spPr/>
-        <p:txBody>
-          <a:bodyPr/>
-          <a:lstStyle/>
-          <a:p>
+        <p:spPr>
+          <a:xfrm>
+            <a:off x="838200" y="1825625"/>
+            <a:ext cx="10515600" cy="2157095"/>
+          </a:xfrm>
+        </p:spPr>
+        <p:txBody>
+          <a:bodyPr/>
+          <a:lstStyle/>
+          <a:p>
+            <a:pPr algn="ctr"/>
             <a:r>
               <a:rPr lang="he-IL" sz="4500" dirty="0"/>
               <a:t>משחק לחימה בין שתי ערים – כרגע עיר "תוקפת" ועיר "הגנה" ( לא מדויק )</a:t>
@@ -3514,6 +3527,21 @@
 <file path=ppt/slides/slide3.xml><?xml version="1.0" encoding="utf-8"?>
 <p:sld xmlns:a="http://schemas.openxmlformats.org/drawingml/2006/main" xmlns:r="http://schemas.openxmlformats.org/officeDocument/2006/relationships" xmlns:p="http://schemas.openxmlformats.org/presentationml/2006/main">
   <p:cSld>
+    <p:bg>
+      <p:bgPr>
+        <a:blipFill dpi="0" rotWithShape="1">
+          <a:blip r:embed="rId2">
+            <a:alphaModFix amt="40000"/>
+            <a:lum/>
+          </a:blip>
+          <a:srcRect/>
+          <a:stretch>
+            <a:fillRect t="-7000" b="-7000"/>
+          </a:stretch>
+        </a:blipFill>
+        <a:effectLst/>
+      </p:bgPr>
+    </p:bg>
     <p:spTree>
       <p:nvGrpSpPr>
         <p:cNvPr id="1" name=""/>
@@ -3533,7 +3561,7 @@
           <p:cNvPr id="2" name="כותרת 1">
             <a:extLst>
               <a:ext uri="{FF2B5EF4-FFF2-40B4-BE49-F238E27FC236}">
-                <a16:creationId xmlns:a16="http://schemas.microsoft.com/office/drawing/2014/main" id="{C5E5A2A1-A6F4-4C77-9812-CD26B7667EAF}"/>
+                <a16:creationId xmlns="" xmlns:a16="http://schemas.microsoft.com/office/drawing/2014/main" id="{C5E5A2A1-A6F4-4C77-9812-CD26B7667EAF}"/>
               </a:ext>
             </a:extLst>
           </p:cNvPr>
@@ -3544,11 +3572,17 @@
             <p:ph type="title"/>
           </p:nvPr>
         </p:nvSpPr>
-        <p:spPr/>
-        <p:txBody>
-          <a:bodyPr/>
-          <a:lstStyle/>
-          <a:p>
+        <p:spPr>
+          <a:xfrm>
+            <a:off x="1264920" y="0"/>
+            <a:ext cx="10515600" cy="1325563"/>
+          </a:xfrm>
+        </p:spPr>
+        <p:txBody>
+          <a:bodyPr/>
+          <a:lstStyle/>
+          <a:p>
+            <a:pPr algn="ctr"/>
             <a:r>
               <a:rPr lang="he-IL" dirty="0"/>
               <a:t>עיר תוקפת</a:t>
@@ -3561,7 +3595,7 @@
           <p:cNvPr id="3" name="מציין מיקום תוכן 2">
             <a:extLst>
               <a:ext uri="{FF2B5EF4-FFF2-40B4-BE49-F238E27FC236}">
-                <a16:creationId xmlns:a16="http://schemas.microsoft.com/office/drawing/2014/main" id="{4BCE6344-699B-4E11-8AFB-C5EFA9EE3E9E}"/>
+                <a16:creationId xmlns="" xmlns:a16="http://schemas.microsoft.com/office/drawing/2014/main" id="{4BCE6344-699B-4E11-8AFB-C5EFA9EE3E9E}"/>
               </a:ext>
             </a:extLst>
           </p:cNvPr>
@@ -3572,7 +3606,12 @@
             <p:ph idx="1"/>
           </p:nvPr>
         </p:nvSpPr>
-        <p:spPr/>
+        <p:spPr>
+          <a:xfrm>
+            <a:off x="1508760" y="1165225"/>
+            <a:ext cx="10515600" cy="4351338"/>
+          </a:xfrm>
+        </p:spPr>
         <p:txBody>
           <a:bodyPr/>
           <a:lstStyle/>
@@ -3582,13 +3621,10 @@
               <a:t>עיר "תוקפת " תדמה את עזה – עיר מאד צפופה אשר יורה טילים לעבר העיר </a:t>
             </a:r>
             <a:r>
-              <a:rPr lang="he-IL" dirty="0" err="1"/>
-              <a:t>השניה</a:t>
-            </a:r>
-            <a:r>
-              <a:rPr lang="he-IL" dirty="0"/>
-              <a:t> בלי יכולת להתגונן</a:t>
-            </a:r>
+              <a:rPr lang="he-IL" dirty="0" smtClean="0"/>
+              <a:t>השנייה – "העיר המגנה"</a:t>
+            </a:r>
+            <a:endParaRPr lang="he-IL" dirty="0"/>
           </a:p>
           <a:p>
             <a:r>
@@ -3596,12 +3632,12 @@
               <a:t>העיר התוקפת תשגר טילים לעיר המגנה בתדירות </a:t>
             </a:r>
             <a:r>
-              <a:rPr lang="he-IL" dirty="0" err="1"/>
-              <a:t>מסויימת</a:t>
+              <a:rPr lang="he-IL" dirty="0" smtClean="0"/>
+              <a:t>מסוימת </a:t>
             </a:r>
             <a:r>
               <a:rPr lang="he-IL" dirty="0"/>
-              <a:t> ( שתשתנה בהתאם להגדרות שנחליט) כאשר בין לבין יוצאת גם העיר המגנה להפצצות מהאוויר</a:t>
+              <a:t>( שתשתנה בהתאם להגדרות שנחליט) כאשר בין לבין יוצאת גם העיר המגנה להפצצות מהאוויר</a:t>
             </a:r>
           </a:p>
           <a:p>
@@ -3628,6 +3664,21 @@
 <file path=ppt/slides/slide4.xml><?xml version="1.0" encoding="utf-8"?>
 <p:sld xmlns:a="http://schemas.openxmlformats.org/drawingml/2006/main" xmlns:r="http://schemas.openxmlformats.org/officeDocument/2006/relationships" xmlns:p="http://schemas.openxmlformats.org/presentationml/2006/main">
   <p:cSld>
+    <p:bg>
+      <p:bgPr>
+        <a:blipFill dpi="0" rotWithShape="1">
+          <a:blip r:embed="rId2">
+            <a:alphaModFix amt="40000"/>
+            <a:lum/>
+          </a:blip>
+          <a:srcRect/>
+          <a:stretch>
+            <a:fillRect t="-7000" b="-7000"/>
+          </a:stretch>
+        </a:blipFill>
+        <a:effectLst/>
+      </p:bgPr>
+    </p:bg>
     <p:spTree>
       <p:nvGrpSpPr>
         <p:cNvPr id="1" name=""/>
@@ -3647,7 +3698,7 @@
           <p:cNvPr id="2" name="כותרת 1">
             <a:extLst>
               <a:ext uri="{FF2B5EF4-FFF2-40B4-BE49-F238E27FC236}">
-                <a16:creationId xmlns:a16="http://schemas.microsoft.com/office/drawing/2014/main" id="{26102378-4BFC-4AC2-9AA6-3A7B234ECCBA}"/>
+                <a16:creationId xmlns="" xmlns:a16="http://schemas.microsoft.com/office/drawing/2014/main" id="{26102378-4BFC-4AC2-9AA6-3A7B234ECCBA}"/>
               </a:ext>
             </a:extLst>
           </p:cNvPr>
@@ -3658,11 +3709,17 @@
             <p:ph type="title"/>
           </p:nvPr>
         </p:nvSpPr>
-        <p:spPr/>
-        <p:txBody>
-          <a:bodyPr/>
-          <a:lstStyle/>
-          <a:p>
+        <p:spPr>
+          <a:xfrm>
+            <a:off x="1010920" y="0"/>
+            <a:ext cx="10515600" cy="1325563"/>
+          </a:xfrm>
+        </p:spPr>
+        <p:txBody>
+          <a:bodyPr/>
+          <a:lstStyle/>
+          <a:p>
+            <a:pPr algn="ctr"/>
             <a:r>
               <a:rPr lang="he-IL" dirty="0"/>
               <a:t>עיר הגנה</a:t>
@@ -3675,7 +3732,7 @@
           <p:cNvPr id="3" name="תיבת טקסט 2">
             <a:extLst>
               <a:ext uri="{FF2B5EF4-FFF2-40B4-BE49-F238E27FC236}">
-                <a16:creationId xmlns:a16="http://schemas.microsoft.com/office/drawing/2014/main" id="{B228F2AD-9745-4B02-B6E6-E95C6D8EBE3B}"/>
+                <a16:creationId xmlns="" xmlns:a16="http://schemas.microsoft.com/office/drawing/2014/main" id="{B228F2AD-9745-4B02-B6E6-E95C6D8EBE3B}"/>
               </a:ext>
             </a:extLst>
           </p:cNvPr>
@@ -3684,8 +3741,8 @@
         </p:nvSpPr>
         <p:spPr>
           <a:xfrm>
-            <a:off x="1097280" y="1930400"/>
-            <a:ext cx="10119360" cy="1754326"/>
+            <a:off x="1625600" y="1325563"/>
+            <a:ext cx="10119360" cy="3046988"/>
           </a:xfrm>
           <a:prstGeom prst="rect">
             <a:avLst/>
@@ -3703,8 +3760,20 @@
               <a:buChar char="-"/>
             </a:pPr>
             <a:r>
-              <a:rPr lang="he-IL" dirty="0"/>
-              <a:t>עיר "הגנה" תדמה את שדרות , ותיאלץ לנטרל את פגיעות היריב על ידי טיל "כיפת ברזל" – בעצם ברגע שישוגר טיל לכיוון העיר , המצלמה תעבור לטיל כיפת ברזל שמשוגר שייאלץ לפגוע בטיל הנגדי כדי למנוע פגיעה</a:t>
+              <a:rPr lang="he-IL" sz="2400" dirty="0"/>
+              <a:t>עיר "הגנה" תדמה את שדרות , ותיאלץ לנטרל את פגיעות היריב על ידי טיל "כיפת ברזל" – בעצם ברגע שישוגר טיל לכיוון </a:t>
+            </a:r>
+            <a:r>
+              <a:rPr lang="he-IL" sz="2400" dirty="0" smtClean="0"/>
+              <a:t>העיר, </a:t>
+            </a:r>
+            <a:r>
+              <a:rPr lang="he-IL" sz="2400" dirty="0"/>
+              <a:t>המצלמה תעבור לטיל כיפת ברזל שמשוגר שייאלץ לפגוע בטיל הנגדי כדי למנוע </a:t>
+            </a:r>
+            <a:r>
+              <a:rPr lang="he-IL" sz="2400" dirty="0" smtClean="0"/>
+              <a:t>פגיעה.</a:t>
             </a:r>
           </a:p>
           <a:p>
@@ -3712,32 +3781,56 @@
               <a:buFontTx/>
               <a:buChar char="-"/>
             </a:pPr>
-            <a:endParaRPr lang="he-IL" dirty="0"/>
+            <a:r>
+              <a:rPr lang="he-IL" sz="2400" dirty="0" smtClean="0"/>
+              <a:t>*אפשרות נוספת המצלמה תעבור למצב "מפעיל מערכת" ולא לשליטה ישירה בטיל.</a:t>
+            </a:r>
+            <a:endParaRPr lang="he-IL" sz="2400" dirty="0"/>
           </a:p>
           <a:p>
             <a:pPr marL="285750" indent="-285750">
               <a:buFontTx/>
               <a:buChar char="-"/>
             </a:pPr>
-            <a:r>
-              <a:rPr lang="he-IL" dirty="0"/>
-              <a:t>יציאות למתקפות אוויריות – בעצם מטוס שיעוף מעל העיר התוקפת ו"יפיל" פצצה במטרה לחסל וליצור נזק בעיר </a:t>
-            </a:r>
-            <a:r>
-              <a:rPr lang="he-IL" dirty="0" err="1"/>
-              <a:t>השניה</a:t>
-            </a:r>
-            <a:r>
-              <a:rPr lang="he-IL" dirty="0"/>
-              <a:t> ולחסל משגרים</a:t>
-            </a:r>
+            <a:endParaRPr lang="he-IL" sz="2400" dirty="0"/>
           </a:p>
           <a:p>
             <a:pPr marL="285750" indent="-285750">
               <a:buFontTx/>
               <a:buChar char="-"/>
             </a:pPr>
-            <a:endParaRPr lang="he-IL" dirty="0"/>
+            <a:r>
+              <a:rPr lang="he-IL" sz="2400" dirty="0"/>
+              <a:t>יציאות למתקפות אוויריות </a:t>
+            </a:r>
+            <a:r>
+              <a:rPr lang="he-IL" sz="2400" dirty="0" smtClean="0"/>
+              <a:t>–מטוס שיבצע גיחה מעל </a:t>
+            </a:r>
+            <a:r>
+              <a:rPr lang="he-IL" sz="2400" dirty="0"/>
+              <a:t>העיר התוקפת ו"יפיל" פצצה במטרה לחסל וליצור נזק בעיר </a:t>
+            </a:r>
+            <a:r>
+              <a:rPr lang="he-IL" sz="2400" dirty="0" smtClean="0"/>
+              <a:t>השנייה </a:t>
+            </a:r>
+            <a:r>
+              <a:rPr lang="he-IL" sz="2400" dirty="0"/>
+              <a:t>ולחסל </a:t>
+            </a:r>
+            <a:r>
+              <a:rPr lang="he-IL" sz="2400" dirty="0" smtClean="0"/>
+              <a:t>משגרים.</a:t>
+            </a:r>
+            <a:endParaRPr lang="he-IL" sz="2400" dirty="0"/>
+          </a:p>
+          <a:p>
+            <a:pPr marL="285750" indent="-285750">
+              <a:buFontTx/>
+              <a:buChar char="-"/>
+            </a:pPr>
+            <a:endParaRPr lang="he-IL" sz="2400" dirty="0"/>
           </a:p>
         </p:txBody>
       </p:sp>
@@ -3757,6 +3850,21 @@
 <file path=ppt/slides/slide5.xml><?xml version="1.0" encoding="utf-8"?>
 <p:sld xmlns:a="http://schemas.openxmlformats.org/drawingml/2006/main" xmlns:r="http://schemas.openxmlformats.org/officeDocument/2006/relationships" xmlns:p="http://schemas.openxmlformats.org/presentationml/2006/main">
   <p:cSld>
+    <p:bg>
+      <p:bgPr>
+        <a:blipFill dpi="0" rotWithShape="1">
+          <a:blip r:embed="rId2">
+            <a:alphaModFix amt="40000"/>
+            <a:lum/>
+          </a:blip>
+          <a:srcRect/>
+          <a:stretch>
+            <a:fillRect t="-7000" b="-7000"/>
+          </a:stretch>
+        </a:blipFill>
+        <a:effectLst/>
+      </p:bgPr>
+    </p:bg>
     <p:spTree>
       <p:nvGrpSpPr>
         <p:cNvPr id="1" name=""/>
@@ -3776,7 +3884,7 @@
           <p:cNvPr id="2" name="כותרת 1">
             <a:extLst>
               <a:ext uri="{FF2B5EF4-FFF2-40B4-BE49-F238E27FC236}">
-                <a16:creationId xmlns:a16="http://schemas.microsoft.com/office/drawing/2014/main" id="{55FC98C0-6F37-4B2F-A942-8EE85E98F160}"/>
+                <a16:creationId xmlns="" xmlns:a16="http://schemas.microsoft.com/office/drawing/2014/main" id="{55FC98C0-6F37-4B2F-A942-8EE85E98F160}"/>
               </a:ext>
             </a:extLst>
           </p:cNvPr>
@@ -3787,16 +3895,22 @@
             <p:ph type="title"/>
           </p:nvPr>
         </p:nvSpPr>
-        <p:spPr/>
+        <p:spPr>
+          <a:xfrm>
+            <a:off x="736600" y="0"/>
+            <a:ext cx="10515600" cy="1325563"/>
+          </a:xfrm>
+        </p:spPr>
         <p:txBody>
           <a:bodyPr/>
           <a:lstStyle/>
           <a:p>
             <a:pPr algn="ctr"/>
             <a:r>
-              <a:rPr lang="he-IL" dirty="0"/>
-              <a:t>התלבטויות</a:t>
-            </a:r>
+              <a:rPr lang="he-IL" dirty="0" smtClean="0"/>
+              <a:t>שיקולים שעלו בתהליך גיבוש הרעיון</a:t>
+            </a:r>
+            <a:endParaRPr lang="he-IL" dirty="0"/>
           </a:p>
         </p:txBody>
       </p:sp>
@@ -3805,7 +3919,7 @@
           <p:cNvPr id="3" name="תיבת טקסט 2">
             <a:extLst>
               <a:ext uri="{FF2B5EF4-FFF2-40B4-BE49-F238E27FC236}">
-                <a16:creationId xmlns:a16="http://schemas.microsoft.com/office/drawing/2014/main" id="{15F69400-19C8-4AA1-8F8A-B25785B629CF}"/>
+                <a16:creationId xmlns="" xmlns:a16="http://schemas.microsoft.com/office/drawing/2014/main" id="{15F69400-19C8-4AA1-8F8A-B25785B629CF}"/>
               </a:ext>
             </a:extLst>
           </p:cNvPr>
@@ -3814,8 +3928,8 @@
         </p:nvSpPr>
         <p:spPr>
           <a:xfrm>
-            <a:off x="2954709" y="1690688"/>
-            <a:ext cx="8399091" cy="3139321"/>
+            <a:off x="2954709" y="1325563"/>
+            <a:ext cx="8399091" cy="4893647"/>
           </a:xfrm>
           <a:prstGeom prst="rect">
             <a:avLst/>
@@ -3829,85 +3943,108 @@
           <a:lstStyle/>
           <a:p>
             <a:r>
-              <a:rPr lang="he-IL" b="1" dirty="0"/>
+              <a:rPr lang="he-IL" sz="2400" b="1" dirty="0"/>
               <a:t>אפשרויות משחק : </a:t>
             </a:r>
-            <a:r>
-              <a:rPr lang="he-IL" dirty="0"/>
-              <a:t>האם לאפשר לשחקן לשחק בתור תוקף?</a:t>
-            </a:r>
-          </a:p>
-          <a:p>
-            <a:pPr marL="285750" indent="-285750">
-              <a:buFontTx/>
-              <a:buChar char="-"/>
-            </a:pPr>
-            <a:r>
-              <a:rPr lang="he-IL" dirty="0"/>
-              <a:t>שיקולים חינוכיים ועקרוניים בעיקר</a:t>
-            </a:r>
-            <a:endParaRPr lang="en-US" dirty="0"/>
-          </a:p>
-          <a:p>
-            <a:endParaRPr lang="he-IL" dirty="0"/>
-          </a:p>
-          <a:p>
-            <a:r>
-              <a:rPr lang="he-IL" b="1" dirty="0"/>
+            <a:endParaRPr lang="he-IL" sz="2400" b="1" dirty="0" smtClean="0"/>
+          </a:p>
+          <a:p>
+            <a:r>
+              <a:rPr lang="he-IL" sz="2400" b="1" dirty="0"/>
+              <a:t>-</a:t>
+            </a:r>
+            <a:r>
+              <a:rPr lang="he-IL" sz="2400" dirty="0" smtClean="0"/>
+              <a:t>האם </a:t>
+            </a:r>
+            <a:r>
+              <a:rPr lang="he-IL" sz="2400" dirty="0"/>
+              <a:t>לאפשר לשחקן לשחק בתור תוקף?</a:t>
+            </a:r>
+          </a:p>
+          <a:p>
+            <a:r>
+              <a:rPr lang="he-IL" sz="2400" dirty="0" smtClean="0"/>
+              <a:t>-שיקולים </a:t>
+            </a:r>
+            <a:r>
+              <a:rPr lang="he-IL" sz="2400" dirty="0"/>
+              <a:t>חינוכיים ועקרוניים </a:t>
+            </a:r>
+            <a:r>
+              <a:rPr lang="he-IL" sz="2400" dirty="0" smtClean="0"/>
+              <a:t>בעיקר – האם לנקו</a:t>
+            </a:r>
+            <a:r>
+              <a:rPr lang="he-IL" sz="2400" dirty="0" smtClean="0"/>
+              <a:t>ט בשמות ערים קיימות או ליצור עולם מקביל וניטרלי </a:t>
+            </a:r>
+            <a:r>
+              <a:rPr lang="he-IL" sz="2400" dirty="0" smtClean="0"/>
+              <a:t> </a:t>
+            </a:r>
+            <a:endParaRPr lang="en-US" sz="2400" dirty="0"/>
+          </a:p>
+          <a:p>
+            <a:endParaRPr lang="he-IL" sz="2400" dirty="0"/>
+          </a:p>
+          <a:p>
+            <a:r>
+              <a:rPr lang="he-IL" sz="2400" b="1" dirty="0"/>
               <a:t>מצב הגנה </a:t>
             </a:r>
             <a:r>
-              <a:rPr lang="he-IL" dirty="0"/>
+              <a:rPr lang="he-IL" sz="2400" dirty="0"/>
               <a:t>– קשה מאד מבחינה פיזיקלית להצליח לפגוע בעולם תלת </a:t>
             </a:r>
             <a:r>
-              <a:rPr lang="he-IL" dirty="0" err="1"/>
+              <a:rPr lang="he-IL" sz="2400" dirty="0" err="1"/>
               <a:t>מימדי</a:t>
             </a:r>
             <a:r>
-              <a:rPr lang="he-IL" dirty="0"/>
+              <a:rPr lang="he-IL" sz="2400" dirty="0"/>
               <a:t> בטיל שעובר לכן קיימת התלבטות ליצור מעין "משחקון" נפרד שמדמה את הפגיעה של הטיל בצורה קלה ומשחקית יותר.</a:t>
             </a:r>
           </a:p>
           <a:p>
-            <a:endParaRPr lang="he-IL" dirty="0"/>
-          </a:p>
-          <a:p>
-            <a:r>
-              <a:rPr lang="he-IL" b="1" dirty="0"/>
+            <a:endParaRPr lang="he-IL" sz="2400" dirty="0"/>
+          </a:p>
+          <a:p>
+            <a:r>
+              <a:rPr lang="he-IL" sz="2400" b="1" dirty="0"/>
               <a:t>ניצחון </a:t>
             </a:r>
             <a:r>
-              <a:rPr lang="he-IL" dirty="0"/>
+              <a:rPr lang="he-IL" sz="2400" dirty="0"/>
               <a:t>– מה מביא לניצחון ? פגיעה ב</a:t>
             </a:r>
             <a:r>
-              <a:rPr lang="en-US" dirty="0"/>
+              <a:rPr lang="en-US" sz="2400" dirty="0"/>
               <a:t>x </a:t>
             </a:r>
             <a:r>
-              <a:rPr lang="he-IL" dirty="0"/>
+              <a:rPr lang="he-IL" sz="2400" dirty="0"/>
               <a:t> מטרות? מה יהיה </a:t>
             </a:r>
             <a:r>
-              <a:rPr lang="en-US" dirty="0"/>
+              <a:rPr lang="en-US" sz="2400" dirty="0"/>
               <a:t>x</a:t>
             </a:r>
             <a:r>
-              <a:rPr lang="he-IL" dirty="0"/>
+              <a:rPr lang="he-IL" sz="2400" dirty="0"/>
               <a:t> כך כדי שאורך המשחק לא יפגע בהנאה</a:t>
             </a:r>
           </a:p>
           <a:p>
-            <a:endParaRPr lang="he-IL" dirty="0"/>
-          </a:p>
-          <a:p>
-            <a:r>
-              <a:rPr lang="he-IL" b="1" dirty="0"/>
+            <a:endParaRPr lang="he-IL" sz="2400" dirty="0"/>
+          </a:p>
+          <a:p>
+            <a:r>
+              <a:rPr lang="he-IL" sz="2400" b="1" dirty="0"/>
               <a:t>רמת יריב </a:t>
             </a:r>
             <a:r>
-              <a:rPr lang="he-IL" dirty="0"/>
+              <a:rPr lang="he-IL" sz="2400" dirty="0"/>
               <a:t>– רנדומלי ? מהלכים מתוכנתים?</a:t>
             </a:r>
           </a:p>

</xml_diff>